<commit_message>
Lablab amaw kaayo haha
</commit_message>
<xml_diff>
--- a/powerpoint/Tests/PitchItup.pptx
+++ b/powerpoint/Tests/PitchItup.pptx
@@ -3000,7 +3000,7 @@
                 </a:solidFill>
                 <a:latin typeface="Calibri"/>
               </a:rPr>
-              <a:t>"Team Bahug Taler"</a:t>
+              <a:t>"Itghurls"</a:t>
             </a:r>
           </a:p>
         </p:txBody>
@@ -3092,7 +3092,7 @@
                 </a:solidFill>
                 <a:latin typeface="Calibri"/>
               </a:rPr>
-              <a:t>PitchItup - A pitch deck nindot generator</a:t>
+              <a:t>PitchItup - an auto generated pitchdeck</a:t>
             </a:r>
           </a:p>
         </p:txBody>
@@ -3207,7 +3207,7 @@
                 </a:solidFill>
                 <a:latin typeface="Calibri"/>
               </a:rPr>
-              <a:t>- Having hard time </a:t>
+              <a:t>- Having hard time creating pitchdeck</a:t>
             </a:r>
             <a:br/>
             <a:r>
@@ -3217,7 +3217,7 @@
                 </a:solidFill>
                 <a:latin typeface="Calibri"/>
               </a:rPr>
-              <a:t>-  dakog ulok</a:t>
+              <a:t>- </a:t>
             </a:r>
           </a:p>
         </p:txBody>
@@ -3342,7 +3342,7 @@
                 </a:solidFill>
                 <a:latin typeface="Calibri"/>
               </a:rPr>
-              <a:t>PitchItup - A pitch deck nindot generator</a:t>
+              <a:t>PitchItup - an auto generated pitchdeck</a:t>
             </a:r>
           </a:p>
         </p:txBody>

</xml_diff>

<commit_message>
I love you Love
</commit_message>
<xml_diff>
--- a/powerpoint/Tests/PitchItup.pptx
+++ b/powerpoint/Tests/PitchItup.pptx
@@ -3000,7 +3000,7 @@
                 </a:solidFill>
                 <a:latin typeface="Calibri"/>
               </a:rPr>
-              <a:t>"Team Bahug Taler"</a:t>
+              <a:t>"Itghurls"</a:t>
             </a:r>
           </a:p>
         </p:txBody>
@@ -3092,7 +3092,7 @@
                 </a:solidFill>
                 <a:latin typeface="Calibri"/>
               </a:rPr>
-              <a:t>PitchItup - A pitch deck nindot generator</a:t>
+              <a:t>PitchItup - a platform as a service for startup pitch deck.</a:t>
             </a:r>
           </a:p>
         </p:txBody>
@@ -3207,7 +3207,7 @@
                 </a:solidFill>
                 <a:latin typeface="Calibri"/>
               </a:rPr>
-              <a:t>- Having hard time </a:t>
+              <a:t>- Having hard time creating pitch deck</a:t>
             </a:r>
             <a:br/>
             <a:r>
@@ -3217,7 +3217,7 @@
                 </a:solidFill>
                 <a:latin typeface="Calibri"/>
               </a:rPr>
-              <a:t>-  dakog ulok</a:t>
+              <a:t>-  having hard time finding templates</a:t>
             </a:r>
           </a:p>
         </p:txBody>
@@ -3342,7 +3342,7 @@
                 </a:solidFill>
                 <a:latin typeface="Calibri"/>
               </a:rPr>
-              <a:t>PitchItup - A pitch deck nindot generator</a:t>
+              <a:t>PitchItup - a platform as a service for startup pitch deck.</a:t>
             </a:r>
           </a:p>
         </p:txBody>
@@ -3457,7 +3457,7 @@
                 </a:solidFill>
                 <a:latin typeface="Calibri"/>
               </a:rPr>
-              <a:t>- asd</a:t>
+              <a:t>- Befmwkniwjk</a:t>
             </a:r>
           </a:p>
         </p:txBody>
@@ -3523,7 +3523,7 @@
                 </a:solidFill>
                 <a:latin typeface="Calibri"/>
               </a:rPr>
-              <a:t>- asd</a:t>
+              <a:t>- ijbwyuvew7beuh</a:t>
             </a:r>
           </a:p>
         </p:txBody>
@@ -3671,7 +3671,7 @@
                 </a:solidFill>
                 <a:latin typeface="Calibri"/>
               </a:rPr>
-              <a:t>- asdsa</a:t>
+              <a:t>- gybgbhj</a:t>
             </a:r>
           </a:p>
         </p:txBody>
@@ -3753,7 +3753,7 @@
                 </a:solidFill>
                 <a:latin typeface="Calibri"/>
               </a:rPr>
-              <a:t>- asdsa</a:t>
+              <a:t>- iubg</a:t>
             </a:r>
           </a:p>
         </p:txBody>
@@ -3901,7 +3901,7 @@
                 </a:solidFill>
                 <a:latin typeface="Calibri"/>
               </a:rPr>
-              <a:t>- asdas</a:t>
+              <a:t>- buuhjbh</a:t>
             </a:r>
           </a:p>
         </p:txBody>
@@ -4016,7 +4016,7 @@
                 </a:solidFill>
                 <a:latin typeface="Calibri"/>
               </a:rPr>
-              <a:t>- asd</a:t>
+              <a:t>- jbwuvwuevhkjwev</a:t>
             </a:r>
           </a:p>
         </p:txBody>

</xml_diff>